<commit_message>
[FIX] Fixed spacing on title page and cover overlay
</commit_message>
<xml_diff>
--- a/CoverCDTitlePage/Cover.pptx
+++ b/CoverCDTitlePage/Cover.pptx
@@ -265,7 +265,7 @@
               <a:pPr>
                 <a:defRPr/>
               </a:pPr>
-              <a:t>13/12/2018</a:t>
+              <a:t>14/05/2019</a:t>
             </a:fld>
             <a:endParaRPr lang="pt-PT"/>
           </a:p>
@@ -776,7 +776,7 @@
               <a:pPr>
                 <a:defRPr/>
               </a:pPr>
-              <a:t>13/12/2018</a:t>
+              <a:t>14/05/2019</a:t>
             </a:fld>
             <a:endParaRPr lang="pt-PT"/>
           </a:p>
@@ -966,7 +966,7 @@
               <a:pPr>
                 <a:defRPr/>
               </a:pPr>
-              <a:t>13/12/2018</a:t>
+              <a:t>14/05/2019</a:t>
             </a:fld>
             <a:endParaRPr lang="pt-PT"/>
           </a:p>
@@ -1166,7 +1166,7 @@
               <a:pPr>
                 <a:defRPr/>
               </a:pPr>
-              <a:t>13/12/2018</a:t>
+              <a:t>14/05/2019</a:t>
             </a:fld>
             <a:endParaRPr lang="pt-PT"/>
           </a:p>
@@ -1356,7 +1356,7 @@
               <a:pPr>
                 <a:defRPr/>
               </a:pPr>
-              <a:t>13/12/2018</a:t>
+              <a:t>14/05/2019</a:t>
             </a:fld>
             <a:endParaRPr lang="pt-PT"/>
           </a:p>
@@ -1623,7 +1623,7 @@
               <a:pPr>
                 <a:defRPr/>
               </a:pPr>
-              <a:t>13/12/2018</a:t>
+              <a:t>14/05/2019</a:t>
             </a:fld>
             <a:endParaRPr lang="pt-PT"/>
           </a:p>
@@ -1930,7 +1930,7 @@
               <a:pPr>
                 <a:defRPr/>
               </a:pPr>
-              <a:t>13/12/2018</a:t>
+              <a:t>14/05/2019</a:t>
             </a:fld>
             <a:endParaRPr lang="pt-PT"/>
           </a:p>
@@ -2376,7 +2376,7 @@
               <a:pPr>
                 <a:defRPr/>
               </a:pPr>
-              <a:t>13/12/2018</a:t>
+              <a:t>14/05/2019</a:t>
             </a:fld>
             <a:endParaRPr lang="pt-PT"/>
           </a:p>
@@ -2515,7 +2515,7 @@
               <a:pPr>
                 <a:defRPr/>
               </a:pPr>
-              <a:t>13/12/2018</a:t>
+              <a:t>14/05/2019</a:t>
             </a:fld>
             <a:endParaRPr lang="pt-PT"/>
           </a:p>
@@ -2632,7 +2632,7 @@
               <a:pPr>
                 <a:defRPr/>
               </a:pPr>
-              <a:t>13/12/2018</a:t>
+              <a:t>14/05/2019</a:t>
             </a:fld>
             <a:endParaRPr lang="pt-PT"/>
           </a:p>
@@ -2929,7 +2929,7 @@
               <a:pPr>
                 <a:defRPr/>
               </a:pPr>
-              <a:t>13/12/2018</a:t>
+              <a:t>14/05/2019</a:t>
             </a:fld>
             <a:endParaRPr lang="pt-PT"/>
           </a:p>
@@ -3209,7 +3209,7 @@
               <a:pPr>
                 <a:defRPr/>
               </a:pPr>
-              <a:t>13/12/2018</a:t>
+              <a:t>14/05/2019</a:t>
             </a:fld>
             <a:endParaRPr lang="pt-PT"/>
           </a:p>
@@ -3465,7 +3465,7 @@
               <a:pPr>
                 <a:defRPr/>
               </a:pPr>
-              <a:t>13/12/2018</a:t>
+              <a:t>14/05/2019</a:t>
             </a:fld>
             <a:endParaRPr lang="pt-PT"/>
           </a:p>
@@ -4073,7 +4073,7 @@
         <p:spPr>
           <a:xfrm>
             <a:off x="8713762" y="4122564"/>
-            <a:ext cx="4842297" cy="6324808"/>
+            <a:ext cx="4842297" cy="6355586"/>
           </a:xfrm>
           <a:prstGeom prst="rect">
             <a:avLst/>
@@ -4105,23 +4105,22 @@
           <a:p>
             <a:r>
               <a:rPr lang="pt-PT" sz="4000" b="1" dirty="0"/>
-              <a:t> </a:t>
-            </a:r>
-          </a:p>
-          <a:p>
-            <a:r>
-              <a:rPr lang="pt-PT" sz="4000" b="1" dirty="0"/>
               <a:t>based on</a:t>
             </a:r>
-          </a:p>
-          <a:p>
-            <a:endParaRPr lang="pt-PT" sz="4000" b="1" dirty="0"/>
           </a:p>
           <a:p>
             <a:r>
               <a:rPr lang="pt-PT" sz="4000" b="1" dirty="0"/>
               <a:t>Reach Sets</a:t>
             </a:r>
+          </a:p>
+          <a:p>
+            <a:endParaRPr lang="pt-PT" sz="4000" b="1" dirty="0"/>
+          </a:p>
+          <a:p>
+            <a:endParaRPr lang="pt-PT" sz="4000" b="1" dirty="0"/>
+          </a:p>
+          <a:p>
             <a:endParaRPr lang="pt-PT" sz="1400" dirty="0"/>
           </a:p>
           <a:p>

</xml_diff>